<commit_message>
Revert to online GameTech2 slides.
</commit_message>
<xml_diff>
--- a/slides/gametech2.pptx
+++ b/slides/gametech2.pptx
@@ -220,7 +220,7 @@
   </p:defaultTextStyle>
   <p:extLst>
     <p:ext uri="{EFAFB233-063F-42B5-8137-9DF3F51BA10A}">
-      <p15:sldGuideLst xmlns:p15="http://schemas.microsoft.com/office/powerpoint/2012/main">
+      <p15:sldGuideLst xmlns="" xmlns:p15="http://schemas.microsoft.com/office/powerpoint/2012/main">
         <p15:guide id="1" orient="horz" pos="4000">
           <p15:clr>
             <a:srgbClr val="A4A3A4"/>
@@ -234,7 +234,7 @@
       </p15:sldGuideLst>
     </p:ext>
     <p:ext uri="{2D200454-40CA-4A62-9FC3-DE9A4176ACB9}">
-      <p15:notesGuideLst xmlns:p15="http://schemas.microsoft.com/office/powerpoint/2012/main">
+      <p15:notesGuideLst xmlns="" xmlns:p15="http://schemas.microsoft.com/office/powerpoint/2012/main">
         <p15:guide id="1" orient="horz" pos="2880">
           <p15:clr>
             <a:srgbClr val="A4A3A4"/>
@@ -2879,7 +2879,7 @@
                   <a:schemeClr val="tx1"/>
                 </a:solidFill>
               </a:rPr>
-              <a:t>27-Oct-14</a:t>
+              <a:t>24-Oct-14</a:t>
             </a:fld>
             <a:endParaRPr lang="de-DE" sz="1000" dirty="0">
               <a:solidFill>

</xml_diff>